<commit_message>
Add a new article.
</commit_message>
<xml_diff>
--- a/presentations/sol2/C++ Now/2019/The Plan for Tomorrow - Compile-Time Extension Points in C++.pptx
+++ b/presentations/sol2/C++ Now/2019/The Plan for Tomorrow - Compile-Time Extension Points in C++.pptx
@@ -282,7 +282,7 @@
           <a:p>
             <a:fld id="{13449C36-73C3-4224-8331-869135EB2B90}" type="datetimeFigureOut">
               <a:rPr lang="en-US" smtClean="0"/>
-              <a:t>5/12/2019</a:t>
+              <a:t>5/23/2019</a:t>
             </a:fld>
             <a:endParaRPr lang="en-US"/>
           </a:p>
@@ -730,7 +730,7 @@
           <a:p>
             <a:fld id="{2BDEFB6A-D7C0-49E8-A29E-E25F66EA05AA}" type="datetime1">
               <a:rPr lang="en-US" smtClean="0"/>
-              <a:t>5/12/2019</a:t>
+              <a:t>5/23/2019</a:t>
             </a:fld>
             <a:endParaRPr lang="en-US"/>
           </a:p>
@@ -788,7 +788,7 @@
   <p:clrMapOvr>
     <a:overrideClrMapping bg1="dk1" tx1="lt1" bg2="dk2" tx2="lt2" accent1="accent1" accent2="accent2" accent3="accent3" accent4="accent4" accent5="accent5" accent6="accent6" hlink="hlink" folHlink="folHlink"/>
   </p:clrMapOvr>
-  <p:extLst mod="1">
+  <p:extLst>
     <p:ext uri="{DCECCB84-F9BA-43D5-87BE-67443E8EF086}">
       <p15:sldGuideLst xmlns:p15="http://schemas.microsoft.com/office/powerpoint/2012/main"/>
     </p:ext>
@@ -905,7 +905,7 @@
           <a:p>
             <a:fld id="{72FB844F-ED82-4773-80EB-580213FC0C6E}" type="datetime1">
               <a:rPr lang="en-US" smtClean="0"/>
-              <a:t>5/12/2019</a:t>
+              <a:t>5/23/2019</a:t>
             </a:fld>
             <a:endParaRPr lang="en-US"/>
           </a:p>
@@ -1128,7 +1128,7 @@
           <a:p>
             <a:fld id="{771D577B-0525-4D8E-8598-8AA442ED03F3}" type="datetime1">
               <a:rPr lang="en-US" smtClean="0"/>
-              <a:t>5/12/2019</a:t>
+              <a:t>5/23/2019</a:t>
             </a:fld>
             <a:endParaRPr lang="en-US"/>
           </a:p>
@@ -1308,7 +1308,7 @@
           <a:p>
             <a:fld id="{4FDED2EB-E507-4171-AD8D-19A001F30C74}" type="datetime1">
               <a:rPr lang="en-US" smtClean="0"/>
-              <a:t>5/12/2019</a:t>
+              <a:t>5/23/2019</a:t>
             </a:fld>
             <a:endParaRPr lang="en-US"/>
           </a:p>
@@ -1614,7 +1614,7 @@
           <a:p>
             <a:fld id="{17E38F93-75A2-413A-AF3F-C328AD2CAA21}" type="datetime1">
               <a:rPr lang="en-US" smtClean="0"/>
-              <a:t>5/12/2019</a:t>
+              <a:t>5/23/2019</a:t>
             </a:fld>
             <a:endParaRPr lang="en-US"/>
           </a:p>
@@ -1688,7 +1688,7 @@
   <p:clrMapOvr>
     <a:overrideClrMapping bg1="lt1" tx1="dk1" bg2="lt2" tx2="dk2" accent1="accent1" accent2="accent2" accent3="accent3" accent4="accent4" accent5="accent5" accent6="accent6" hlink="hlink" folHlink="folHlink"/>
   </p:clrMapOvr>
-  <p:extLst mod="1">
+  <p:extLst>
     <p:ext uri="{DCECCB84-F9BA-43D5-87BE-67443E8EF086}">
       <p15:sldGuideLst xmlns:p15="http://schemas.microsoft.com/office/powerpoint/2012/main"/>
     </p:ext>
@@ -1923,7 +1923,7 @@
           <a:p>
             <a:fld id="{A51CCFCD-F7B1-4610-9C38-AF43C5894724}" type="datetime1">
               <a:rPr lang="en-US" smtClean="0"/>
-              <a:t>5/12/2019</a:t>
+              <a:t>5/23/2019</a:t>
             </a:fld>
             <a:endParaRPr lang="en-US"/>
           </a:p>
@@ -2345,7 +2345,7 @@
           <a:p>
             <a:fld id="{E39E7314-9BFE-440E-B359-D49E5F05B4A5}" type="datetime1">
               <a:rPr lang="en-US" smtClean="0"/>
-              <a:t>5/12/2019</a:t>
+              <a:t>5/23/2019</a:t>
             </a:fld>
             <a:endParaRPr lang="en-US"/>
           </a:p>
@@ -2463,7 +2463,7 @@
           <a:p>
             <a:fld id="{454447C9-7FB4-4B25-8AFD-0CAF15024084}" type="datetime1">
               <a:rPr lang="en-US" smtClean="0"/>
-              <a:t>5/12/2019</a:t>
+              <a:t>5/23/2019</a:t>
             </a:fld>
             <a:endParaRPr lang="en-US"/>
           </a:p>
@@ -2558,7 +2558,7 @@
           <a:p>
             <a:fld id="{47DB09D1-4795-49D4-AC83-CBFB2F8805F7}" type="datetime1">
               <a:rPr lang="en-US" smtClean="0"/>
-              <a:t>5/12/2019</a:t>
+              <a:t>5/23/2019</a:t>
             </a:fld>
             <a:endParaRPr lang="en-US"/>
           </a:p>
@@ -2616,7 +2616,7 @@
   <p:clrMapOvr>
     <a:masterClrMapping/>
   </p:clrMapOvr>
-  <p:extLst mod="1">
+  <p:extLst>
     <p:ext uri="{DCECCB84-F9BA-43D5-87BE-67443E8EF086}">
       <p15:sldGuideLst xmlns:p15="http://schemas.microsoft.com/office/powerpoint/2012/main"/>
     </p:ext>
@@ -2836,7 +2836,7 @@
           <a:p>
             <a:fld id="{884F8AB5-E837-43D5-B2E0-83C291658AD3}" type="datetime1">
               <a:rPr lang="en-US" smtClean="0"/>
-              <a:t>5/12/2019</a:t>
+              <a:t>5/23/2019</a:t>
             </a:fld>
             <a:endParaRPr lang="en-US"/>
           </a:p>
@@ -3101,7 +3101,7 @@
           <a:p>
             <a:fld id="{02B6E417-0D9A-4749-930B-60672ED7AE35}" type="datetime1">
               <a:rPr lang="en-US" smtClean="0"/>
-              <a:t>5/12/2019</a:t>
+              <a:t>5/23/2019</a:t>
             </a:fld>
             <a:endParaRPr lang="en-US"/>
           </a:p>
@@ -3350,7 +3350,7 @@
           <a:p>
             <a:fld id="{E5E3ACAB-5AA3-4B59-A51D-954AD544C7D6}" type="datetime1">
               <a:rPr lang="en-US" smtClean="0"/>
-              <a:t>5/12/2019</a:t>
+              <a:t>5/23/2019</a:t>
             </a:fld>
             <a:endParaRPr lang="en-US"/>
           </a:p>
@@ -3786,7 +3786,7 @@
       </a:lvl9pPr>
     </p:otherStyle>
   </p:txStyles>
-  <p:extLst mod="1">
+  <p:extLst>
     <p:ext uri="{27BBF7A9-308A-43DC-89C8-2F10F3537804}">
       <p15:sldGuideLst xmlns:p15="http://schemas.microsoft.com/office/powerpoint/2012/main"/>
     </p:ext>
@@ -30022,7 +30022,7 @@
             </a:r>
             <a:r>
               <a:rPr lang="en-US" dirty="0" err="1"/>
-              <a:t>Feselier</a:t>
+              <a:t>Fiselier</a:t>
             </a:r>
             <a:r>
               <a:rPr lang="en-US" dirty="0"/>

</xml_diff>